<commit_message>
Fix formatting; Added slide with guidance on password rotation;
</commit_message>
<xml_diff>
--- a/ServicePrincipal/PPT/ServicePrincipal.pptx
+++ b/ServicePrincipal/PPT/ServicePrincipal.pptx
@@ -9,7 +9,7 @@
     <p:sldId id="257" r:id="rId3"/>
     <p:sldId id="259" r:id="rId4"/>
     <p:sldId id="260" r:id="rId5"/>
-    <p:sldId id="261" r:id="rId6"/>
+    <p:sldId id="263" r:id="rId6"/>
     <p:sldId id="262" r:id="rId7"/>
     <p:sldId id="258" r:id="rId8"/>
   </p:sldIdLst>
@@ -110,7 +110,16 @@
       </a:defRPr>
     </a:lvl9pPr>
   </p:defaultTextStyle>
+  <p:extLst>
+    <p:ext uri="{EFAFB233-063F-42B5-8137-9DF3F51BA10A}">
+      <p15:sldGuideLst xmlns:p15="http://schemas.microsoft.com/office/powerpoint/2012/main"/>
+    </p:ext>
+  </p:extLst>
 </p:presentation>
+</file>
+
+<file path=ppt/revisionInfo.xml><?xml version="1.0" encoding="utf-8"?>
+<p1510:revInfo xmlns:a="http://schemas.openxmlformats.org/drawingml/2006/main" xmlns:r="http://schemas.openxmlformats.org/officeDocument/2006/relationships" xmlns:p1510="http://schemas.microsoft.com/office/powerpoint/2015/10/main"/>
 </file>
 
 <file path=ppt/slideLayouts/slideLayout1.xml><?xml version="1.0" encoding="utf-8"?>
@@ -313,7 +322,7 @@
           <a:p>
             <a:fld id="{80E408E2-D498-41CB-AFAD-555839786AEB}" type="datetimeFigureOut">
               <a:rPr lang="en-US" smtClean="0"/>
-              <a:t>1/24/2018</a:t>
+              <a:t>1/25/2018</a:t>
             </a:fld>
             <a:endParaRPr lang="en-US" dirty="0"/>
           </a:p>
@@ -503,7 +512,7 @@
           <a:p>
             <a:fld id="{80E408E2-D498-41CB-AFAD-555839786AEB}" type="datetimeFigureOut">
               <a:rPr lang="en-US" smtClean="0"/>
-              <a:t>1/24/2018</a:t>
+              <a:t>1/25/2018</a:t>
             </a:fld>
             <a:endParaRPr lang="en-US" dirty="0"/>
           </a:p>
@@ -683,7 +692,7 @@
           <a:p>
             <a:fld id="{80E408E2-D498-41CB-AFAD-555839786AEB}" type="datetimeFigureOut">
               <a:rPr lang="en-US" smtClean="0"/>
-              <a:t>1/24/2018</a:t>
+              <a:t>1/25/2018</a:t>
             </a:fld>
             <a:endParaRPr lang="en-US" dirty="0"/>
           </a:p>
@@ -853,7 +862,7 @@
           <a:p>
             <a:fld id="{80E408E2-D498-41CB-AFAD-555839786AEB}" type="datetimeFigureOut">
               <a:rPr lang="en-US" smtClean="0"/>
-              <a:t>1/24/2018</a:t>
+              <a:t>1/25/2018</a:t>
             </a:fld>
             <a:endParaRPr lang="en-US" dirty="0"/>
           </a:p>
@@ -1109,7 +1118,7 @@
           <a:p>
             <a:fld id="{80E408E2-D498-41CB-AFAD-555839786AEB}" type="datetimeFigureOut">
               <a:rPr lang="en-US" smtClean="0"/>
-              <a:t>1/24/2018</a:t>
+              <a:t>1/25/2018</a:t>
             </a:fld>
             <a:endParaRPr lang="en-US" dirty="0"/>
           </a:p>
@@ -1397,7 +1406,7 @@
           <a:p>
             <a:fld id="{80E408E2-D498-41CB-AFAD-555839786AEB}" type="datetimeFigureOut">
               <a:rPr lang="en-US" smtClean="0"/>
-              <a:t>1/24/2018</a:t>
+              <a:t>1/25/2018</a:t>
             </a:fld>
             <a:endParaRPr lang="en-US" dirty="0"/>
           </a:p>
@@ -1835,7 +1844,7 @@
           <a:p>
             <a:fld id="{80E408E2-D498-41CB-AFAD-555839786AEB}" type="datetimeFigureOut">
               <a:rPr lang="en-US" smtClean="0"/>
-              <a:t>1/24/2018</a:t>
+              <a:t>1/25/2018</a:t>
             </a:fld>
             <a:endParaRPr lang="en-US" dirty="0"/>
           </a:p>
@@ -1953,7 +1962,7 @@
           <a:p>
             <a:fld id="{80E408E2-D498-41CB-AFAD-555839786AEB}" type="datetimeFigureOut">
               <a:rPr lang="en-US" smtClean="0"/>
-              <a:t>1/24/2018</a:t>
+              <a:t>1/25/2018</a:t>
             </a:fld>
             <a:endParaRPr lang="en-US" dirty="0"/>
           </a:p>
@@ -2048,7 +2057,7 @@
           <a:p>
             <a:fld id="{80E408E2-D498-41CB-AFAD-555839786AEB}" type="datetimeFigureOut">
               <a:rPr lang="en-US" smtClean="0"/>
-              <a:t>1/24/2018</a:t>
+              <a:t>1/25/2018</a:t>
             </a:fld>
             <a:endParaRPr lang="en-US" dirty="0"/>
           </a:p>
@@ -2404,7 +2413,7 @@
           <a:p>
             <a:fld id="{80E408E2-D498-41CB-AFAD-555839786AEB}" type="datetimeFigureOut">
               <a:rPr lang="en-US" smtClean="0"/>
-              <a:t>1/24/2018</a:t>
+              <a:t>1/25/2018</a:t>
             </a:fld>
             <a:endParaRPr lang="en-US" dirty="0"/>
           </a:p>
@@ -2719,7 +2728,7 @@
           <a:p>
             <a:fld id="{80E408E2-D498-41CB-AFAD-555839786AEB}" type="datetimeFigureOut">
               <a:rPr lang="en-US" smtClean="0"/>
-              <a:t>1/24/2018</a:t>
+              <a:t>1/25/2018</a:t>
             </a:fld>
             <a:endParaRPr lang="en-US" dirty="0"/>
           </a:p>
@@ -2952,7 +2961,7 @@
           <a:p>
             <a:fld id="{80E408E2-D498-41CB-AFAD-555839786AEB}" type="datetimeFigureOut">
               <a:rPr lang="en-US" smtClean="0"/>
-              <a:t>1/24/2018</a:t>
+              <a:t>1/25/2018</a:t>
             </a:fld>
             <a:endParaRPr lang="en-US" dirty="0"/>
           </a:p>
@@ -3730,37 +3739,35 @@
           </a:bodyPr>
           <a:lstStyle/>
           <a:p>
-            <a:pPr lvl="1"/>
             <a:r>
               <a:rPr lang="en-US" dirty="0"/>
               <a:t>Consider creating one Service Principal account per application:</a:t>
             </a:r>
           </a:p>
           <a:p>
-            <a:pPr lvl="2"/>
-            <a:r>
-              <a:rPr lang="en-US" dirty="0"/>
+            <a:pPr lvl="1"/>
+            <a:r>
+              <a:rPr lang="en-US" i="0" dirty="0"/>
               <a:t>Reduces the surface area of attack since if one application’s service principal account get’s compromised, only that  application is considered compromised;</a:t>
             </a:r>
           </a:p>
           <a:p>
-            <a:pPr lvl="2"/>
-            <a:r>
-              <a:rPr lang="en-US" dirty="0"/>
+            <a:pPr lvl="1"/>
+            <a:r>
+              <a:rPr lang="en-US" i="0" dirty="0"/>
               <a:t>Provides deployment isolation to prevent common cases such as application A is messing up application B components (e.g. resource group, storage account, Azure SQL, etc.);</a:t>
             </a:r>
           </a:p>
           <a:p>
-            <a:pPr lvl="1"/>
             <a:r>
               <a:rPr lang="en-US" dirty="0"/>
               <a:t>The above considerations also applies in case there is a single application that spans across multiple regions (e.g. East US = Primary, West US = Secondary)</a:t>
             </a:r>
           </a:p>
           <a:p>
-            <a:pPr lvl="2"/>
-            <a:r>
-              <a:rPr lang="en-US" dirty="0"/>
+            <a:pPr lvl="1"/>
+            <a:r>
+              <a:rPr lang="en-US" i="0" dirty="0"/>
               <a:t>Use different Service Principal accounts for each region</a:t>
             </a:r>
           </a:p>
@@ -3847,7 +3854,6 @@
           </a:bodyPr>
           <a:lstStyle/>
           <a:p>
-            <a:pPr lvl="1"/>
             <a:r>
               <a:rPr lang="en-US" dirty="0"/>
               <a:t>Try to follow the </a:t>
@@ -3862,14 +3868,14 @@
             </a:r>
           </a:p>
           <a:p>
-            <a:pPr lvl="2"/>
+            <a:pPr lvl="1"/>
             <a:r>
               <a:rPr lang="en-US" dirty="0"/>
               <a:t>Avoid assigning a role (e.g. contributor) to Service Principal account with scope at the subscription level, specially if the subscription is shared among multiple applications and/or development teams that may or may not have the same security requirements</a:t>
             </a:r>
           </a:p>
           <a:p>
-            <a:pPr lvl="3"/>
+            <a:pPr lvl="2"/>
             <a:r>
               <a:rPr lang="en-US" dirty="0"/>
               <a:t>Consider giving a Service Principal account permissions to one or more resource groups that contain components for a single application only</a:t>
@@ -3964,14 +3970,13 @@
           </a:bodyPr>
           <a:lstStyle/>
           <a:p>
-            <a:pPr lvl="1"/>
             <a:r>
               <a:rPr lang="en-US" dirty="0"/>
               <a:t>Assuming the application is using the Azure Key Vault to store secrets, keys and certificates</a:t>
             </a:r>
           </a:p>
           <a:p>
-            <a:pPr lvl="2"/>
+            <a:pPr lvl="1"/>
             <a:r>
               <a:rPr lang="en-US" dirty="0"/>
               <a:t>Consider having a Service Principal account with all Key Vault permissions for deployment, and read-only one to be used during application runtime</a:t>
@@ -4018,7 +4023,7 @@
           <p:cNvPr id="2" name="Title 1">
             <a:extLst>
               <a:ext uri="{FF2B5EF4-FFF2-40B4-BE49-F238E27FC236}">
-                <a16:creationId xmlns:a16="http://schemas.microsoft.com/office/drawing/2014/main" id="{3E97A5FC-1806-482B-89CF-D9284E248444}"/>
+                <a16:creationId xmlns:a16="http://schemas.microsoft.com/office/drawing/2014/main" id="{877315F6-AC89-4637-B163-6ACF32D4D974}"/>
               </a:ext>
             </a:extLst>
           </p:cNvPr>
@@ -4036,7 +4041,7 @@
           <a:p>
             <a:r>
               <a:rPr lang="en-US" dirty="0"/>
-              <a:t>Key Vault – Deployment vs Runtime</a:t>
+              <a:t>Service Principal Password</a:t>
             </a:r>
           </a:p>
         </p:txBody>
@@ -4046,7 +4051,7 @@
           <p:cNvPr id="3" name="Content Placeholder 2">
             <a:extLst>
               <a:ext uri="{FF2B5EF4-FFF2-40B4-BE49-F238E27FC236}">
-                <a16:creationId xmlns:a16="http://schemas.microsoft.com/office/drawing/2014/main" id="{E0B5CE51-1CED-4B07-BD96-0291431CA0A8}"/>
+                <a16:creationId xmlns:a16="http://schemas.microsoft.com/office/drawing/2014/main" id="{5A2A275E-3EFD-42F1-BCFC-17B3AE980EA1}"/>
               </a:ext>
             </a:extLst>
           </p:cNvPr>
@@ -4064,27 +4069,43 @@
           <a:p>
             <a:r>
               <a:rPr lang="en-US" dirty="0"/>
-              <a:t>Assuming the application is using Azure Key Vault to store secrets/keys/certificates</a:t>
+              <a:t>Use strong passwords</a:t>
             </a:r>
           </a:p>
           <a:p>
             <a:pPr lvl="1"/>
-            <a:endParaRPr lang="en-US" dirty="0"/>
+            <a:r>
+              <a:rPr lang="en-US" dirty="0"/>
+              <a:t>Check with company security requirements and approved tools for password generation</a:t>
+            </a:r>
           </a:p>
           <a:p>
             <a:pPr lvl="1"/>
-            <a:endParaRPr lang="en-US" dirty="0"/>
-          </a:p>
-          <a:p>
-            <a:pPr lvl="1"/>
-            <a:endParaRPr lang="en-US" dirty="0"/>
+            <a:r>
+              <a:rPr lang="en-US" dirty="0"/>
+              <a:t>Careful with special characters if you’re using Terraform on Windows, some are not recognized. So, test it before you break CI/CD!</a:t>
+            </a:r>
+          </a:p>
+          <a:p>
+            <a:r>
+              <a:rPr lang="en-US" dirty="0"/>
+              <a:t>Change the Service Principal account’s password frequently (e.g. </a:t>
+            </a:r>
+            <a:r>
+              <a:rPr lang="en-US"/>
+              <a:t>90 days</a:t>
+            </a:r>
+            <a:r>
+              <a:rPr lang="en-US" dirty="0"/>
+              <a:t>) and build support for this process</a:t>
+            </a:r>
           </a:p>
         </p:txBody>
       </p:sp>
     </p:spTree>
     <p:extLst>
       <p:ext uri="{BB962C8B-B14F-4D97-AF65-F5344CB8AC3E}">
-        <p14:creationId xmlns:p14="http://schemas.microsoft.com/office/powerpoint/2010/main" val="3838410295"/>
+        <p14:creationId xmlns:p14="http://schemas.microsoft.com/office/powerpoint/2010/main" val="1717302887"/>
       </p:ext>
     </p:extLst>
   </p:cSld>

</xml_diff>